<commit_message>
Add first version of ui behaviours doc
</commit_message>
<xml_diff>
--- a/docs/images/modeler/BehaviourLifecycle.pptx
+++ b/docs/images/modeler/BehaviourLifecycle.pptx
@@ -259,7 +259,7 @@
           <a:p>
             <a:fld id="{8F6B8F7E-561F-4D0C-80D5-A06481037D10}" type="datetimeFigureOut">
               <a:rPr lang="en-US" smtClean="0"/>
-              <a:t>7/6/2018</a:t>
+              <a:t>7/20/2018</a:t>
             </a:fld>
             <a:endParaRPr lang="en-US"/>
           </a:p>
@@ -457,7 +457,7 @@
           <a:p>
             <a:fld id="{8F6B8F7E-561F-4D0C-80D5-A06481037D10}" type="datetimeFigureOut">
               <a:rPr lang="en-US" smtClean="0"/>
-              <a:t>7/6/2018</a:t>
+              <a:t>7/20/2018</a:t>
             </a:fld>
             <a:endParaRPr lang="en-US"/>
           </a:p>
@@ -665,7 +665,7 @@
           <a:p>
             <a:fld id="{8F6B8F7E-561F-4D0C-80D5-A06481037D10}" type="datetimeFigureOut">
               <a:rPr lang="en-US" smtClean="0"/>
-              <a:t>7/6/2018</a:t>
+              <a:t>7/20/2018</a:t>
             </a:fld>
             <a:endParaRPr lang="en-US"/>
           </a:p>
@@ -863,7 +863,7 @@
           <a:p>
             <a:fld id="{8F6B8F7E-561F-4D0C-80D5-A06481037D10}" type="datetimeFigureOut">
               <a:rPr lang="en-US" smtClean="0"/>
-              <a:t>7/6/2018</a:t>
+              <a:t>7/20/2018</a:t>
             </a:fld>
             <a:endParaRPr lang="en-US"/>
           </a:p>
@@ -1138,7 +1138,7 @@
           <a:p>
             <a:fld id="{8F6B8F7E-561F-4D0C-80D5-A06481037D10}" type="datetimeFigureOut">
               <a:rPr lang="en-US" smtClean="0"/>
-              <a:t>7/6/2018</a:t>
+              <a:t>7/20/2018</a:t>
             </a:fld>
             <a:endParaRPr lang="en-US"/>
           </a:p>
@@ -1403,7 +1403,7 @@
           <a:p>
             <a:fld id="{8F6B8F7E-561F-4D0C-80D5-A06481037D10}" type="datetimeFigureOut">
               <a:rPr lang="en-US" smtClean="0"/>
-              <a:t>7/6/2018</a:t>
+              <a:t>7/20/2018</a:t>
             </a:fld>
             <a:endParaRPr lang="en-US"/>
           </a:p>
@@ -1815,7 +1815,7 @@
           <a:p>
             <a:fld id="{8F6B8F7E-561F-4D0C-80D5-A06481037D10}" type="datetimeFigureOut">
               <a:rPr lang="en-US" smtClean="0"/>
-              <a:t>7/6/2018</a:t>
+              <a:t>7/20/2018</a:t>
             </a:fld>
             <a:endParaRPr lang="en-US"/>
           </a:p>
@@ -1956,7 +1956,7 @@
           <a:p>
             <a:fld id="{8F6B8F7E-561F-4D0C-80D5-A06481037D10}" type="datetimeFigureOut">
               <a:rPr lang="en-US" smtClean="0"/>
-              <a:t>7/6/2018</a:t>
+              <a:t>7/20/2018</a:t>
             </a:fld>
             <a:endParaRPr lang="en-US"/>
           </a:p>
@@ -2069,7 +2069,7 @@
           <a:p>
             <a:fld id="{8F6B8F7E-561F-4D0C-80D5-A06481037D10}" type="datetimeFigureOut">
               <a:rPr lang="en-US" smtClean="0"/>
-              <a:t>7/6/2018</a:t>
+              <a:t>7/20/2018</a:t>
             </a:fld>
             <a:endParaRPr lang="en-US"/>
           </a:p>
@@ -2380,7 +2380,7 @@
           <a:p>
             <a:fld id="{8F6B8F7E-561F-4D0C-80D5-A06481037D10}" type="datetimeFigureOut">
               <a:rPr lang="en-US" smtClean="0"/>
-              <a:t>7/6/2018</a:t>
+              <a:t>7/20/2018</a:t>
             </a:fld>
             <a:endParaRPr lang="en-US"/>
           </a:p>
@@ -2668,7 +2668,7 @@
           <a:p>
             <a:fld id="{8F6B8F7E-561F-4D0C-80D5-A06481037D10}" type="datetimeFigureOut">
               <a:rPr lang="en-US" smtClean="0"/>
-              <a:t>7/6/2018</a:t>
+              <a:t>7/20/2018</a:t>
             </a:fld>
             <a:endParaRPr lang="en-US"/>
           </a:p>
@@ -2909,7 +2909,7 @@
           <a:p>
             <a:fld id="{8F6B8F7E-561F-4D0C-80D5-A06481037D10}" type="datetimeFigureOut">
               <a:rPr lang="en-US" smtClean="0"/>
-              <a:t>7/6/2018</a:t>
+              <a:t>7/20/2018</a:t>
             </a:fld>
             <a:endParaRPr lang="en-US"/>
           </a:p>
@@ -3673,6 +3673,202 @@
           </a:p>
         </p:txBody>
       </p:sp>
+      <p:sp>
+        <p:nvSpPr>
+          <p:cNvPr id="12" name="Arrow: Down 11">
+            <a:extLst>
+              <a:ext uri="{FF2B5EF4-FFF2-40B4-BE49-F238E27FC236}">
+                <a16:creationId xmlns:a16="http://schemas.microsoft.com/office/drawing/2014/main" id="{FDED7D77-8882-4999-92C6-A301760DE433}"/>
+              </a:ext>
+            </a:extLst>
+          </p:cNvPr>
+          <p:cNvSpPr/>
+          <p:nvPr/>
+        </p:nvSpPr>
+        <p:spPr>
+          <a:xfrm>
+            <a:off x="6719144" y="888024"/>
+            <a:ext cx="1019908" cy="2387110"/>
+          </a:xfrm>
+          <a:prstGeom prst="downArrow">
+            <a:avLst/>
+          </a:prstGeom>
+          <a:solidFill>
+            <a:schemeClr val="accent5">
+              <a:alpha val="50000"/>
+            </a:schemeClr>
+          </a:solidFill>
+          <a:ln>
+            <a:noFill/>
+          </a:ln>
+        </p:spPr>
+        <p:style>
+          <a:lnRef idx="0">
+            <a:scrgbClr r="0" g="0" b="0"/>
+          </a:lnRef>
+          <a:fillRef idx="0">
+            <a:scrgbClr r="0" g="0" b="0"/>
+          </a:fillRef>
+          <a:effectRef idx="0">
+            <a:scrgbClr r="0" g="0" b="0"/>
+          </a:effectRef>
+          <a:fontRef idx="minor">
+            <a:schemeClr val="lt1"/>
+          </a:fontRef>
+        </p:style>
+        <p:txBody>
+          <a:bodyPr rtlCol="0" anchor="ctr"/>
+          <a:lstStyle/>
+          <a:p>
+            <a:pPr algn="ctr"/>
+            <a:endParaRPr lang="en-US"/>
+          </a:p>
+        </p:txBody>
+      </p:sp>
+      <p:sp>
+        <p:nvSpPr>
+          <p:cNvPr id="13" name="Rectangle 12">
+            <a:extLst>
+              <a:ext uri="{FF2B5EF4-FFF2-40B4-BE49-F238E27FC236}">
+                <a16:creationId xmlns:a16="http://schemas.microsoft.com/office/drawing/2014/main" id="{F32D9A5A-E172-4AEA-995C-274838D07629}"/>
+              </a:ext>
+            </a:extLst>
+          </p:cNvPr>
+          <p:cNvSpPr/>
+          <p:nvPr/>
+        </p:nvSpPr>
+        <p:spPr>
+          <a:xfrm>
+            <a:off x="7114797" y="1055077"/>
+            <a:ext cx="2558561" cy="474785"/>
+          </a:xfrm>
+          <a:prstGeom prst="rect">
+            <a:avLst/>
+          </a:prstGeom>
+          <a:ln/>
+        </p:spPr>
+        <p:style>
+          <a:lnRef idx="3">
+            <a:schemeClr val="lt1"/>
+          </a:lnRef>
+          <a:fillRef idx="1">
+            <a:schemeClr val="accent2"/>
+          </a:fillRef>
+          <a:effectRef idx="1">
+            <a:schemeClr val="accent2"/>
+          </a:effectRef>
+          <a:fontRef idx="minor">
+            <a:schemeClr val="lt1"/>
+          </a:fontRef>
+        </p:style>
+        <p:txBody>
+          <a:bodyPr rtlCol="0" anchor="ctr"/>
+          <a:lstStyle/>
+          <a:p>
+            <a:pPr algn="ctr"/>
+            <a:r>
+              <a:rPr lang="en-US" dirty="0"/>
+              <a:t>Initialize</a:t>
+            </a:r>
+          </a:p>
+        </p:txBody>
+      </p:sp>
+      <p:sp>
+        <p:nvSpPr>
+          <p:cNvPr id="14" name="Rectangle 13">
+            <a:extLst>
+              <a:ext uri="{FF2B5EF4-FFF2-40B4-BE49-F238E27FC236}">
+                <a16:creationId xmlns:a16="http://schemas.microsoft.com/office/drawing/2014/main" id="{3208EA9A-2023-4DC8-ACD1-704896E63A00}"/>
+              </a:ext>
+            </a:extLst>
+          </p:cNvPr>
+          <p:cNvSpPr/>
+          <p:nvPr/>
+        </p:nvSpPr>
+        <p:spPr>
+          <a:xfrm>
+            <a:off x="7114797" y="1696916"/>
+            <a:ext cx="2558561" cy="474785"/>
+          </a:xfrm>
+          <a:prstGeom prst="rect">
+            <a:avLst/>
+          </a:prstGeom>
+          <a:ln/>
+        </p:spPr>
+        <p:style>
+          <a:lnRef idx="3">
+            <a:schemeClr val="lt1"/>
+          </a:lnRef>
+          <a:fillRef idx="1">
+            <a:schemeClr val="accent5"/>
+          </a:fillRef>
+          <a:effectRef idx="1">
+            <a:schemeClr val="accent5"/>
+          </a:effectRef>
+          <a:fontRef idx="minor">
+            <a:schemeClr val="lt1"/>
+          </a:fontRef>
+        </p:style>
+        <p:txBody>
+          <a:bodyPr rtlCol="0" anchor="ctr"/>
+          <a:lstStyle/>
+          <a:p>
+            <a:pPr algn="ctr"/>
+            <a:r>
+              <a:rPr lang="en-US" dirty="0"/>
+              <a:t>On Change</a:t>
+            </a:r>
+          </a:p>
+        </p:txBody>
+      </p:sp>
+      <p:sp>
+        <p:nvSpPr>
+          <p:cNvPr id="17" name="Rectangle 16">
+            <a:extLst>
+              <a:ext uri="{FF2B5EF4-FFF2-40B4-BE49-F238E27FC236}">
+                <a16:creationId xmlns:a16="http://schemas.microsoft.com/office/drawing/2014/main" id="{29463C14-E814-4579-B2D6-F284734CFD25}"/>
+              </a:ext>
+            </a:extLst>
+          </p:cNvPr>
+          <p:cNvSpPr/>
+          <p:nvPr/>
+        </p:nvSpPr>
+        <p:spPr>
+          <a:xfrm>
+            <a:off x="7114797" y="2409093"/>
+            <a:ext cx="2558561" cy="474785"/>
+          </a:xfrm>
+          <a:prstGeom prst="rect">
+            <a:avLst/>
+          </a:prstGeom>
+          <a:ln/>
+        </p:spPr>
+        <p:style>
+          <a:lnRef idx="3">
+            <a:schemeClr val="lt1"/>
+          </a:lnRef>
+          <a:fillRef idx="1">
+            <a:schemeClr val="accent2"/>
+          </a:fillRef>
+          <a:effectRef idx="1">
+            <a:schemeClr val="accent2"/>
+          </a:effectRef>
+          <a:fontRef idx="minor">
+            <a:schemeClr val="lt1"/>
+          </a:fontRef>
+        </p:style>
+        <p:txBody>
+          <a:bodyPr rtlCol="0" anchor="ctr"/>
+          <a:lstStyle/>
+          <a:p>
+            <a:pPr algn="ctr"/>
+            <a:r>
+              <a:rPr lang="en-US" dirty="0"/>
+              <a:t>Before Save</a:t>
+            </a:r>
+          </a:p>
+        </p:txBody>
+      </p:sp>
     </p:spTree>
     <p:extLst>
       <p:ext uri="{BB962C8B-B14F-4D97-AF65-F5344CB8AC3E}">

</xml_diff>